<commit_message>
Add insertion sort notes
</commit_message>
<xml_diff>
--- a/Bubble Sort In Action.pptx
+++ b/Bubble Sort In Action.pptx
@@ -271,7 +271,7 @@
           <a:p>
             <a:fld id="{5C7A54E4-F532-4F3B-A879-4DEEA90CC876}" type="datetimeFigureOut">
               <a:rPr lang="en-US" smtClean="0"/>
-              <a:t>12/2/2020</a:t>
+              <a:t>12/7/2020</a:t>
             </a:fld>
             <a:endParaRPr lang="en-US"/>
           </a:p>
@@ -469,7 +469,7 @@
           <a:p>
             <a:fld id="{5C7A54E4-F532-4F3B-A879-4DEEA90CC876}" type="datetimeFigureOut">
               <a:rPr lang="en-US" smtClean="0"/>
-              <a:t>12/2/2020</a:t>
+              <a:t>12/7/2020</a:t>
             </a:fld>
             <a:endParaRPr lang="en-US"/>
           </a:p>
@@ -677,7 +677,7 @@
           <a:p>
             <a:fld id="{5C7A54E4-F532-4F3B-A879-4DEEA90CC876}" type="datetimeFigureOut">
               <a:rPr lang="en-US" smtClean="0"/>
-              <a:t>12/2/2020</a:t>
+              <a:t>12/7/2020</a:t>
             </a:fld>
             <a:endParaRPr lang="en-US"/>
           </a:p>
@@ -875,7 +875,7 @@
           <a:p>
             <a:fld id="{5C7A54E4-F532-4F3B-A879-4DEEA90CC876}" type="datetimeFigureOut">
               <a:rPr lang="en-US" smtClean="0"/>
-              <a:t>12/2/2020</a:t>
+              <a:t>12/7/2020</a:t>
             </a:fld>
             <a:endParaRPr lang="en-US"/>
           </a:p>
@@ -1150,7 +1150,7 @@
           <a:p>
             <a:fld id="{5C7A54E4-F532-4F3B-A879-4DEEA90CC876}" type="datetimeFigureOut">
               <a:rPr lang="en-US" smtClean="0"/>
-              <a:t>12/2/2020</a:t>
+              <a:t>12/7/2020</a:t>
             </a:fld>
             <a:endParaRPr lang="en-US"/>
           </a:p>
@@ -1415,7 +1415,7 @@
           <a:p>
             <a:fld id="{5C7A54E4-F532-4F3B-A879-4DEEA90CC876}" type="datetimeFigureOut">
               <a:rPr lang="en-US" smtClean="0"/>
-              <a:t>12/2/2020</a:t>
+              <a:t>12/7/2020</a:t>
             </a:fld>
             <a:endParaRPr lang="en-US"/>
           </a:p>
@@ -1827,7 +1827,7 @@
           <a:p>
             <a:fld id="{5C7A54E4-F532-4F3B-A879-4DEEA90CC876}" type="datetimeFigureOut">
               <a:rPr lang="en-US" smtClean="0"/>
-              <a:t>12/2/2020</a:t>
+              <a:t>12/7/2020</a:t>
             </a:fld>
             <a:endParaRPr lang="en-US"/>
           </a:p>
@@ -1968,7 +1968,7 @@
           <a:p>
             <a:fld id="{5C7A54E4-F532-4F3B-A879-4DEEA90CC876}" type="datetimeFigureOut">
               <a:rPr lang="en-US" smtClean="0"/>
-              <a:t>12/2/2020</a:t>
+              <a:t>12/7/2020</a:t>
             </a:fld>
             <a:endParaRPr lang="en-US"/>
           </a:p>
@@ -2081,7 +2081,7 @@
           <a:p>
             <a:fld id="{5C7A54E4-F532-4F3B-A879-4DEEA90CC876}" type="datetimeFigureOut">
               <a:rPr lang="en-US" smtClean="0"/>
-              <a:t>12/2/2020</a:t>
+              <a:t>12/7/2020</a:t>
             </a:fld>
             <a:endParaRPr lang="en-US"/>
           </a:p>
@@ -2392,7 +2392,7 @@
           <a:p>
             <a:fld id="{5C7A54E4-F532-4F3B-A879-4DEEA90CC876}" type="datetimeFigureOut">
               <a:rPr lang="en-US" smtClean="0"/>
-              <a:t>12/2/2020</a:t>
+              <a:t>12/7/2020</a:t>
             </a:fld>
             <a:endParaRPr lang="en-US"/>
           </a:p>
@@ -2680,7 +2680,7 @@
           <a:p>
             <a:fld id="{5C7A54E4-F532-4F3B-A879-4DEEA90CC876}" type="datetimeFigureOut">
               <a:rPr lang="en-US" smtClean="0"/>
-              <a:t>12/2/2020</a:t>
+              <a:t>12/7/2020</a:t>
             </a:fld>
             <a:endParaRPr lang="en-US"/>
           </a:p>
@@ -2921,7 +2921,7 @@
           <a:p>
             <a:fld id="{5C7A54E4-F532-4F3B-A879-4DEEA90CC876}" type="datetimeFigureOut">
               <a:rPr lang="en-US" smtClean="0"/>
-              <a:t>12/2/2020</a:t>
+              <a:t>12/7/2020</a:t>
             </a:fld>
             <a:endParaRPr lang="en-US"/>
           </a:p>
@@ -4918,8 +4918,8 @@
           </a:p>
         </p:txBody>
       </p:sp>
-      <mc:AlternateContent xmlns:mc="http://schemas.openxmlformats.org/markup-compatibility/2006">
-        <mc:Choice xmlns:a14="http://schemas.microsoft.com/office/drawing/2010/main" Requires="a14">
+      <mc:AlternateContent xmlns:mc="http://schemas.openxmlformats.org/markup-compatibility/2006" xmlns:a14="http://schemas.microsoft.com/office/drawing/2010/main">
+        <mc:Choice Requires="a14">
           <p:sp>
             <p:nvSpPr>
               <p:cNvPr id="3" name="Content Placeholder 2">
@@ -5073,7 +5073,7 @@
             </p:txBody>
           </p:sp>
         </mc:Choice>
-        <mc:Fallback>
+        <mc:Fallback xmlns="">
           <p:sp>
             <p:nvSpPr>
               <p:cNvPr id="3" name="Content Placeholder 2">

</xml_diff>